<commit_message>
Added week 2 files
</commit_message>
<xml_diff>
--- a/2023-SUM/Week03.pptx
+++ b/2023-SUM/Week03.pptx
@@ -3408,17 +3408,13 @@
                   </a:schemeClr>
                 </a:solidFill>
               </a:rPr>
-              <a:t>Week 3</a:t>
-            </a:r>
-            <a:r>
-              <a:rPr lang="en-US">
-                <a:solidFill>
-                  <a:schemeClr val="accent1">
-                    <a:lumMod val="50000"/>
-                  </a:schemeClr>
-                </a:solidFill>
-              </a:rPr>
-              <a:t>: 2023-06-08 to 06-14</a:t>
+              <a:t>Week 3: 2023-06-08 to 06-14</a:t>
+            </a:r>
+          </a:p>
+          <a:p>
+            <a:r>
+              <a:rPr lang="en-US"/>
+              <a:t>Chapter 5</a:t>
             </a:r>
             <a:endParaRPr lang="en-US" dirty="0">
               <a:solidFill>

</xml_diff>